<commit_message>
Added borders to header
</commit_message>
<xml_diff>
--- a/assets_projects/icons.pptx
+++ b/assets_projects/icons.pptx
@@ -15,6 +15,7 @@
     <p:sldId id="263" r:id="rId9"/>
     <p:sldId id="264" r:id="rId10"/>
     <p:sldId id="265" r:id="rId11"/>
+    <p:sldId id="266" r:id="rId12"/>
   </p:sldIdLst>
   <p:sldSz cx="12192000" cy="6858000"/>
   <p:notesSz cx="6858000" cy="9144000"/>
@@ -113,6 +114,11 @@
       </a:defRPr>
     </a:lvl9pPr>
   </p:defaultTextStyle>
+  <p:extLst>
+    <p:ext uri="{EFAFB233-063F-42B5-8137-9DF3F51BA10A}">
+      <p15:sldGuideLst xmlns:p15="http://schemas.microsoft.com/office/powerpoint/2012/main"/>
+    </p:ext>
+  </p:extLst>
 </p:presentation>
 </file>
 
@@ -265,7 +271,7 @@
           <a:p>
             <a:fld id="{FACF253C-1B82-4696-A9A4-5C7E14F754E5}" type="datetimeFigureOut">
               <a:rPr lang="en-US" smtClean="0"/>
-              <a:t>5/5/2022</a:t>
+              <a:t>5/6/2022</a:t>
             </a:fld>
             <a:endParaRPr lang="en-US"/>
           </a:p>
@@ -465,7 +471,7 @@
           <a:p>
             <a:fld id="{FACF253C-1B82-4696-A9A4-5C7E14F754E5}" type="datetimeFigureOut">
               <a:rPr lang="en-US" smtClean="0"/>
-              <a:t>5/5/2022</a:t>
+              <a:t>5/6/2022</a:t>
             </a:fld>
             <a:endParaRPr lang="en-US"/>
           </a:p>
@@ -675,7 +681,7 @@
           <a:p>
             <a:fld id="{FACF253C-1B82-4696-A9A4-5C7E14F754E5}" type="datetimeFigureOut">
               <a:rPr lang="en-US" smtClean="0"/>
-              <a:t>5/5/2022</a:t>
+              <a:t>5/6/2022</a:t>
             </a:fld>
             <a:endParaRPr lang="en-US"/>
           </a:p>
@@ -875,7 +881,7 @@
           <a:p>
             <a:fld id="{FACF253C-1B82-4696-A9A4-5C7E14F754E5}" type="datetimeFigureOut">
               <a:rPr lang="en-US" smtClean="0"/>
-              <a:t>5/5/2022</a:t>
+              <a:t>5/6/2022</a:t>
             </a:fld>
             <a:endParaRPr lang="en-US"/>
           </a:p>
@@ -1151,7 +1157,7 @@
           <a:p>
             <a:fld id="{FACF253C-1B82-4696-A9A4-5C7E14F754E5}" type="datetimeFigureOut">
               <a:rPr lang="en-US" smtClean="0"/>
-              <a:t>5/5/2022</a:t>
+              <a:t>5/6/2022</a:t>
             </a:fld>
             <a:endParaRPr lang="en-US"/>
           </a:p>
@@ -1419,7 +1425,7 @@
           <a:p>
             <a:fld id="{FACF253C-1B82-4696-A9A4-5C7E14F754E5}" type="datetimeFigureOut">
               <a:rPr lang="en-US" smtClean="0"/>
-              <a:t>5/5/2022</a:t>
+              <a:t>5/6/2022</a:t>
             </a:fld>
             <a:endParaRPr lang="en-US"/>
           </a:p>
@@ -1834,7 +1840,7 @@
           <a:p>
             <a:fld id="{FACF253C-1B82-4696-A9A4-5C7E14F754E5}" type="datetimeFigureOut">
               <a:rPr lang="en-US" smtClean="0"/>
-              <a:t>5/5/2022</a:t>
+              <a:t>5/6/2022</a:t>
             </a:fld>
             <a:endParaRPr lang="en-US"/>
           </a:p>
@@ -1976,7 +1982,7 @@
           <a:p>
             <a:fld id="{FACF253C-1B82-4696-A9A4-5C7E14F754E5}" type="datetimeFigureOut">
               <a:rPr lang="en-US" smtClean="0"/>
-              <a:t>5/5/2022</a:t>
+              <a:t>5/6/2022</a:t>
             </a:fld>
             <a:endParaRPr lang="en-US"/>
           </a:p>
@@ -2089,7 +2095,7 @@
           <a:p>
             <a:fld id="{FACF253C-1B82-4696-A9A4-5C7E14F754E5}" type="datetimeFigureOut">
               <a:rPr lang="en-US" smtClean="0"/>
-              <a:t>5/5/2022</a:t>
+              <a:t>5/6/2022</a:t>
             </a:fld>
             <a:endParaRPr lang="en-US"/>
           </a:p>
@@ -2402,7 +2408,7 @@
           <a:p>
             <a:fld id="{FACF253C-1B82-4696-A9A4-5C7E14F754E5}" type="datetimeFigureOut">
               <a:rPr lang="en-US" smtClean="0"/>
-              <a:t>5/5/2022</a:t>
+              <a:t>5/6/2022</a:t>
             </a:fld>
             <a:endParaRPr lang="en-US"/>
           </a:p>
@@ -2691,7 +2697,7 @@
           <a:p>
             <a:fld id="{FACF253C-1B82-4696-A9A4-5C7E14F754E5}" type="datetimeFigureOut">
               <a:rPr lang="en-US" smtClean="0"/>
-              <a:t>5/5/2022</a:t>
+              <a:t>5/6/2022</a:t>
             </a:fld>
             <a:endParaRPr lang="en-US"/>
           </a:p>
@@ -2940,7 +2946,7 @@
           <a:p>
             <a:fld id="{FACF253C-1B82-4696-A9A4-5C7E14F754E5}" type="datetimeFigureOut">
               <a:rPr lang="en-US" smtClean="0"/>
-              <a:t>5/5/2022</a:t>
+              <a:t>5/6/2022</a:t>
             </a:fld>
             <a:endParaRPr lang="en-US"/>
           </a:p>
@@ -6498,6 +6504,577 @@
 </p:sld>
 </file>
 
+<file path=ppt/slides/slide11.xml><?xml version="1.0" encoding="utf-8"?>
+<p:sld xmlns:a="http://schemas.openxmlformats.org/drawingml/2006/main" xmlns:r="http://schemas.openxmlformats.org/officeDocument/2006/relationships" xmlns:p="http://schemas.openxmlformats.org/presentationml/2006/main">
+  <p:cSld>
+    <p:bg>
+      <p:bgPr>
+        <a:solidFill>
+          <a:schemeClr val="bg1">
+            <a:lumMod val="85000"/>
+          </a:schemeClr>
+        </a:solidFill>
+        <a:effectLst/>
+      </p:bgPr>
+    </p:bg>
+    <p:spTree>
+      <p:nvGrpSpPr>
+        <p:cNvPr id="1" name=""/>
+        <p:cNvGrpSpPr/>
+        <p:nvPr/>
+      </p:nvGrpSpPr>
+      <p:grpSpPr>
+        <a:xfrm>
+          <a:off x="0" y="0"/>
+          <a:ext cx="0" cy="0"/>
+          <a:chOff x="0" y="0"/>
+          <a:chExt cx="0" cy="0"/>
+        </a:xfrm>
+      </p:grpSpPr>
+      <p:grpSp>
+        <p:nvGrpSpPr>
+          <p:cNvPr id="6" name="Grupa 5">
+            <a:extLst>
+              <a:ext uri="{FF2B5EF4-FFF2-40B4-BE49-F238E27FC236}">
+                <a16:creationId xmlns:a16="http://schemas.microsoft.com/office/drawing/2014/main" id="{CEE2BCFC-D845-AB90-08D3-49CBEC8EAF1E}"/>
+              </a:ext>
+            </a:extLst>
+          </p:cNvPr>
+          <p:cNvGrpSpPr/>
+          <p:nvPr/>
+        </p:nvGrpSpPr>
+        <p:grpSpPr>
+          <a:xfrm>
+            <a:off x="3992765" y="2177331"/>
+            <a:ext cx="1353788" cy="1353787"/>
+            <a:chOff x="3992765" y="2177331"/>
+            <a:chExt cx="1353788" cy="1353787"/>
+          </a:xfrm>
+        </p:grpSpPr>
+        <p:sp>
+          <p:nvSpPr>
+            <p:cNvPr id="3" name="Prostokąt 2">
+              <a:extLst>
+                <a:ext uri="{FF2B5EF4-FFF2-40B4-BE49-F238E27FC236}">
+                  <a16:creationId xmlns:a16="http://schemas.microsoft.com/office/drawing/2014/main" id="{BF58381A-10F5-D59D-D145-ECD789FB52DB}"/>
+                </a:ext>
+              </a:extLst>
+            </p:cNvPr>
+            <p:cNvSpPr/>
+            <p:nvPr/>
+          </p:nvSpPr>
+          <p:spPr>
+            <a:xfrm>
+              <a:off x="3992766" y="2177331"/>
+              <a:ext cx="1353787" cy="1353787"/>
+            </a:xfrm>
+            <a:prstGeom prst="rect">
+              <a:avLst/>
+            </a:prstGeom>
+            <a:solidFill>
+              <a:srgbClr val="ECEA90"/>
+            </a:solidFill>
+            <a:ln>
+              <a:noFill/>
+            </a:ln>
+          </p:spPr>
+          <p:style>
+            <a:lnRef idx="2">
+              <a:schemeClr val="accent1">
+                <a:shade val="50000"/>
+              </a:schemeClr>
+            </a:lnRef>
+            <a:fillRef idx="1">
+              <a:schemeClr val="accent1"/>
+            </a:fillRef>
+            <a:effectRef idx="0">
+              <a:schemeClr val="accent1"/>
+            </a:effectRef>
+            <a:fontRef idx="minor">
+              <a:schemeClr val="lt1"/>
+            </a:fontRef>
+          </p:style>
+          <p:txBody>
+            <a:bodyPr rtlCol="0" anchor="ctr"/>
+            <a:lstStyle/>
+            <a:p>
+              <a:pPr algn="ctr"/>
+              <a:endParaRPr lang="en-US" dirty="0"/>
+            </a:p>
+          </p:txBody>
+        </p:sp>
+        <p:sp>
+          <p:nvSpPr>
+            <p:cNvPr id="4" name="Trójkąt prostokątny 3">
+              <a:extLst>
+                <a:ext uri="{FF2B5EF4-FFF2-40B4-BE49-F238E27FC236}">
+                  <a16:creationId xmlns:a16="http://schemas.microsoft.com/office/drawing/2014/main" id="{1ED77D33-725E-EB37-838F-FC5C1703D1C4}"/>
+                </a:ext>
+              </a:extLst>
+            </p:cNvPr>
+            <p:cNvSpPr/>
+            <p:nvPr/>
+          </p:nvSpPr>
+          <p:spPr>
+            <a:xfrm>
+              <a:off x="3992765" y="2177331"/>
+              <a:ext cx="1353788" cy="1353787"/>
+            </a:xfrm>
+            <a:prstGeom prst="rtTriangle">
+              <a:avLst/>
+            </a:prstGeom>
+            <a:solidFill>
+              <a:srgbClr val="B4B00A"/>
+            </a:solidFill>
+            <a:ln>
+              <a:noFill/>
+            </a:ln>
+          </p:spPr>
+          <p:style>
+            <a:lnRef idx="2">
+              <a:schemeClr val="accent1">
+                <a:shade val="50000"/>
+              </a:schemeClr>
+            </a:lnRef>
+            <a:fillRef idx="1">
+              <a:schemeClr val="accent1"/>
+            </a:fillRef>
+            <a:effectRef idx="0">
+              <a:schemeClr val="accent1"/>
+            </a:effectRef>
+            <a:fontRef idx="minor">
+              <a:schemeClr val="lt1"/>
+            </a:fontRef>
+          </p:style>
+          <p:txBody>
+            <a:bodyPr rtlCol="0" anchor="ctr"/>
+            <a:lstStyle/>
+            <a:p>
+              <a:pPr algn="ctr"/>
+              <a:endParaRPr lang="en-US"/>
+            </a:p>
+          </p:txBody>
+        </p:sp>
+        <p:sp>
+          <p:nvSpPr>
+            <p:cNvPr id="5" name="Prostokąt 4">
+              <a:extLst>
+                <a:ext uri="{FF2B5EF4-FFF2-40B4-BE49-F238E27FC236}">
+                  <a16:creationId xmlns:a16="http://schemas.microsoft.com/office/drawing/2014/main" id="{81A67B9A-6DF6-B2CB-3661-0609709580EE}"/>
+                </a:ext>
+              </a:extLst>
+            </p:cNvPr>
+            <p:cNvSpPr/>
+            <p:nvPr/>
+          </p:nvSpPr>
+          <p:spPr>
+            <a:xfrm>
+              <a:off x="4166320" y="2350885"/>
+              <a:ext cx="1006678" cy="1006678"/>
+            </a:xfrm>
+            <a:prstGeom prst="rect">
+              <a:avLst/>
+            </a:prstGeom>
+            <a:solidFill>
+              <a:srgbClr val="FFFF0A"/>
+            </a:solidFill>
+            <a:ln>
+              <a:noFill/>
+            </a:ln>
+          </p:spPr>
+          <p:style>
+            <a:lnRef idx="2">
+              <a:schemeClr val="accent1">
+                <a:shade val="50000"/>
+              </a:schemeClr>
+            </a:lnRef>
+            <a:fillRef idx="1">
+              <a:schemeClr val="accent1"/>
+            </a:fillRef>
+            <a:effectRef idx="0">
+              <a:schemeClr val="accent1"/>
+            </a:effectRef>
+            <a:fontRef idx="minor">
+              <a:schemeClr val="lt1"/>
+            </a:fontRef>
+          </p:style>
+          <p:txBody>
+            <a:bodyPr rtlCol="0" anchor="ctr"/>
+            <a:lstStyle/>
+            <a:p>
+              <a:pPr algn="ctr"/>
+              <a:endParaRPr lang="en-US"/>
+            </a:p>
+          </p:txBody>
+        </p:sp>
+      </p:grpSp>
+      <p:grpSp>
+        <p:nvGrpSpPr>
+          <p:cNvPr id="7" name="Grupa 6">
+            <a:extLst>
+              <a:ext uri="{FF2B5EF4-FFF2-40B4-BE49-F238E27FC236}">
+                <a16:creationId xmlns:a16="http://schemas.microsoft.com/office/drawing/2014/main" id="{8187516A-D439-4763-9D07-E4215CD1DA88}"/>
+              </a:ext>
+            </a:extLst>
+          </p:cNvPr>
+          <p:cNvGrpSpPr/>
+          <p:nvPr/>
+        </p:nvGrpSpPr>
+        <p:grpSpPr>
+          <a:xfrm rot="10800000">
+            <a:off x="416741" y="2075213"/>
+            <a:ext cx="1353788" cy="1353787"/>
+            <a:chOff x="3992765" y="2177331"/>
+            <a:chExt cx="1353788" cy="1353787"/>
+          </a:xfrm>
+        </p:grpSpPr>
+        <p:sp>
+          <p:nvSpPr>
+            <p:cNvPr id="8" name="Prostokąt 7">
+              <a:extLst>
+                <a:ext uri="{FF2B5EF4-FFF2-40B4-BE49-F238E27FC236}">
+                  <a16:creationId xmlns:a16="http://schemas.microsoft.com/office/drawing/2014/main" id="{21157DDD-C70C-01C3-E8F1-F899069EEB1A}"/>
+                </a:ext>
+              </a:extLst>
+            </p:cNvPr>
+            <p:cNvSpPr/>
+            <p:nvPr/>
+          </p:nvSpPr>
+          <p:spPr>
+            <a:xfrm>
+              <a:off x="3992766" y="2177331"/>
+              <a:ext cx="1353787" cy="1353787"/>
+            </a:xfrm>
+            <a:prstGeom prst="rect">
+              <a:avLst/>
+            </a:prstGeom>
+            <a:solidFill>
+              <a:srgbClr val="ECEA90"/>
+            </a:solidFill>
+            <a:ln>
+              <a:noFill/>
+            </a:ln>
+          </p:spPr>
+          <p:style>
+            <a:lnRef idx="2">
+              <a:schemeClr val="accent1">
+                <a:shade val="50000"/>
+              </a:schemeClr>
+            </a:lnRef>
+            <a:fillRef idx="1">
+              <a:schemeClr val="accent1"/>
+            </a:fillRef>
+            <a:effectRef idx="0">
+              <a:schemeClr val="accent1"/>
+            </a:effectRef>
+            <a:fontRef idx="minor">
+              <a:schemeClr val="lt1"/>
+            </a:fontRef>
+          </p:style>
+          <p:txBody>
+            <a:bodyPr rtlCol="0" anchor="ctr"/>
+            <a:lstStyle/>
+            <a:p>
+              <a:pPr algn="ctr"/>
+              <a:endParaRPr lang="en-US" dirty="0"/>
+            </a:p>
+          </p:txBody>
+        </p:sp>
+        <p:sp>
+          <p:nvSpPr>
+            <p:cNvPr id="9" name="Trójkąt prostokątny 8">
+              <a:extLst>
+                <a:ext uri="{FF2B5EF4-FFF2-40B4-BE49-F238E27FC236}">
+                  <a16:creationId xmlns:a16="http://schemas.microsoft.com/office/drawing/2014/main" id="{F7F61B3B-FE1E-5606-A162-F11401C2348A}"/>
+                </a:ext>
+              </a:extLst>
+            </p:cNvPr>
+            <p:cNvSpPr/>
+            <p:nvPr/>
+          </p:nvSpPr>
+          <p:spPr>
+            <a:xfrm>
+              <a:off x="3992765" y="2177331"/>
+              <a:ext cx="1353788" cy="1353787"/>
+            </a:xfrm>
+            <a:prstGeom prst="rtTriangle">
+              <a:avLst/>
+            </a:prstGeom>
+            <a:solidFill>
+              <a:srgbClr val="B4B00A"/>
+            </a:solidFill>
+            <a:ln>
+              <a:noFill/>
+            </a:ln>
+          </p:spPr>
+          <p:style>
+            <a:lnRef idx="2">
+              <a:schemeClr val="accent1">
+                <a:shade val="50000"/>
+              </a:schemeClr>
+            </a:lnRef>
+            <a:fillRef idx="1">
+              <a:schemeClr val="accent1"/>
+            </a:fillRef>
+            <a:effectRef idx="0">
+              <a:schemeClr val="accent1"/>
+            </a:effectRef>
+            <a:fontRef idx="minor">
+              <a:schemeClr val="lt1"/>
+            </a:fontRef>
+          </p:style>
+          <p:txBody>
+            <a:bodyPr rtlCol="0" anchor="ctr"/>
+            <a:lstStyle/>
+            <a:p>
+              <a:pPr algn="ctr"/>
+              <a:endParaRPr lang="en-US"/>
+            </a:p>
+          </p:txBody>
+        </p:sp>
+        <p:sp>
+          <p:nvSpPr>
+            <p:cNvPr id="10" name="Prostokąt 9">
+              <a:extLst>
+                <a:ext uri="{FF2B5EF4-FFF2-40B4-BE49-F238E27FC236}">
+                  <a16:creationId xmlns:a16="http://schemas.microsoft.com/office/drawing/2014/main" id="{5D1DEF93-690E-9B7C-458D-4D3889BEA60A}"/>
+                </a:ext>
+              </a:extLst>
+            </p:cNvPr>
+            <p:cNvSpPr/>
+            <p:nvPr/>
+          </p:nvSpPr>
+          <p:spPr>
+            <a:xfrm>
+              <a:off x="4166320" y="2350885"/>
+              <a:ext cx="1006678" cy="1006678"/>
+            </a:xfrm>
+            <a:prstGeom prst="rect">
+              <a:avLst/>
+            </a:prstGeom>
+            <a:solidFill>
+              <a:srgbClr val="9E9A00"/>
+            </a:solidFill>
+            <a:ln>
+              <a:noFill/>
+            </a:ln>
+          </p:spPr>
+          <p:style>
+            <a:lnRef idx="2">
+              <a:schemeClr val="accent1">
+                <a:shade val="50000"/>
+              </a:schemeClr>
+            </a:lnRef>
+            <a:fillRef idx="1">
+              <a:schemeClr val="accent1"/>
+            </a:fillRef>
+            <a:effectRef idx="0">
+              <a:schemeClr val="accent1"/>
+            </a:effectRef>
+            <a:fontRef idx="minor">
+              <a:schemeClr val="lt1"/>
+            </a:fontRef>
+          </p:style>
+          <p:txBody>
+            <a:bodyPr rtlCol="0" anchor="ctr"/>
+            <a:lstStyle/>
+            <a:p>
+              <a:pPr algn="ctr"/>
+              <a:endParaRPr lang="en-US"/>
+            </a:p>
+          </p:txBody>
+        </p:sp>
+      </p:grpSp>
+      <p:grpSp>
+        <p:nvGrpSpPr>
+          <p:cNvPr id="11" name="Grupa 10">
+            <a:extLst>
+              <a:ext uri="{FF2B5EF4-FFF2-40B4-BE49-F238E27FC236}">
+                <a16:creationId xmlns:a16="http://schemas.microsoft.com/office/drawing/2014/main" id="{802D3E9F-1A9E-D75F-F364-E6AF3CB58DBF}"/>
+              </a:ext>
+            </a:extLst>
+          </p:cNvPr>
+          <p:cNvGrpSpPr/>
+          <p:nvPr/>
+        </p:nvGrpSpPr>
+        <p:grpSpPr>
+          <a:xfrm rot="10800000">
+            <a:off x="5520107" y="2170997"/>
+            <a:ext cx="1353788" cy="1353787"/>
+            <a:chOff x="3992765" y="2177331"/>
+            <a:chExt cx="1353788" cy="1353787"/>
+          </a:xfrm>
+        </p:grpSpPr>
+        <p:sp>
+          <p:nvSpPr>
+            <p:cNvPr id="12" name="Prostokąt 11">
+              <a:extLst>
+                <a:ext uri="{FF2B5EF4-FFF2-40B4-BE49-F238E27FC236}">
+                  <a16:creationId xmlns:a16="http://schemas.microsoft.com/office/drawing/2014/main" id="{A57D2248-89ED-BCE2-85BB-4456BD758611}"/>
+                </a:ext>
+              </a:extLst>
+            </p:cNvPr>
+            <p:cNvSpPr/>
+            <p:nvPr/>
+          </p:nvSpPr>
+          <p:spPr>
+            <a:xfrm>
+              <a:off x="3992766" y="2177331"/>
+              <a:ext cx="1353787" cy="1353787"/>
+            </a:xfrm>
+            <a:prstGeom prst="rect">
+              <a:avLst/>
+            </a:prstGeom>
+            <a:solidFill>
+              <a:srgbClr val="A4A11C"/>
+            </a:solidFill>
+            <a:ln>
+              <a:noFill/>
+            </a:ln>
+          </p:spPr>
+          <p:style>
+            <a:lnRef idx="2">
+              <a:schemeClr val="accent1">
+                <a:shade val="50000"/>
+              </a:schemeClr>
+            </a:lnRef>
+            <a:fillRef idx="1">
+              <a:schemeClr val="accent1"/>
+            </a:fillRef>
+            <a:effectRef idx="0">
+              <a:schemeClr val="accent1"/>
+            </a:effectRef>
+            <a:fontRef idx="minor">
+              <a:schemeClr val="lt1"/>
+            </a:fontRef>
+          </p:style>
+          <p:txBody>
+            <a:bodyPr rtlCol="0" anchor="ctr"/>
+            <a:lstStyle/>
+            <a:p>
+              <a:pPr algn="ctr"/>
+              <a:endParaRPr lang="en-US" dirty="0"/>
+            </a:p>
+          </p:txBody>
+        </p:sp>
+        <p:sp>
+          <p:nvSpPr>
+            <p:cNvPr id="13" name="Trójkąt prostokątny 12">
+              <a:extLst>
+                <a:ext uri="{FF2B5EF4-FFF2-40B4-BE49-F238E27FC236}">
+                  <a16:creationId xmlns:a16="http://schemas.microsoft.com/office/drawing/2014/main" id="{8DA9F012-2DD4-D07B-AC1A-3CE893449816}"/>
+                </a:ext>
+              </a:extLst>
+            </p:cNvPr>
+            <p:cNvSpPr/>
+            <p:nvPr/>
+          </p:nvSpPr>
+          <p:spPr>
+            <a:xfrm>
+              <a:off x="3992765" y="2177331"/>
+              <a:ext cx="1353788" cy="1353787"/>
+            </a:xfrm>
+            <a:prstGeom prst="rtTriangle">
+              <a:avLst/>
+            </a:prstGeom>
+            <a:solidFill>
+              <a:srgbClr val="504E04"/>
+            </a:solidFill>
+            <a:ln>
+              <a:noFill/>
+            </a:ln>
+          </p:spPr>
+          <p:style>
+            <a:lnRef idx="2">
+              <a:schemeClr val="accent1">
+                <a:shade val="50000"/>
+              </a:schemeClr>
+            </a:lnRef>
+            <a:fillRef idx="1">
+              <a:schemeClr val="accent1"/>
+            </a:fillRef>
+            <a:effectRef idx="0">
+              <a:schemeClr val="accent1"/>
+            </a:effectRef>
+            <a:fontRef idx="minor">
+              <a:schemeClr val="lt1"/>
+            </a:fontRef>
+          </p:style>
+          <p:txBody>
+            <a:bodyPr rtlCol="0" anchor="ctr"/>
+            <a:lstStyle/>
+            <a:p>
+              <a:pPr algn="ctr"/>
+              <a:endParaRPr lang="en-US"/>
+            </a:p>
+          </p:txBody>
+        </p:sp>
+        <p:sp>
+          <p:nvSpPr>
+            <p:cNvPr id="14" name="Prostokąt 13">
+              <a:extLst>
+                <a:ext uri="{FF2B5EF4-FFF2-40B4-BE49-F238E27FC236}">
+                  <a16:creationId xmlns:a16="http://schemas.microsoft.com/office/drawing/2014/main" id="{E15511D2-A554-6302-78B8-F30EF003A493}"/>
+                </a:ext>
+              </a:extLst>
+            </p:cNvPr>
+            <p:cNvSpPr/>
+            <p:nvPr/>
+          </p:nvSpPr>
+          <p:spPr>
+            <a:xfrm>
+              <a:off x="4166320" y="2350885"/>
+              <a:ext cx="1006678" cy="1006678"/>
+            </a:xfrm>
+            <a:prstGeom prst="rect">
+              <a:avLst/>
+            </a:prstGeom>
+            <a:solidFill>
+              <a:srgbClr val="686600"/>
+            </a:solidFill>
+            <a:ln>
+              <a:noFill/>
+            </a:ln>
+          </p:spPr>
+          <p:style>
+            <a:lnRef idx="2">
+              <a:schemeClr val="accent1">
+                <a:shade val="50000"/>
+              </a:schemeClr>
+            </a:lnRef>
+            <a:fillRef idx="1">
+              <a:schemeClr val="accent1"/>
+            </a:fillRef>
+            <a:effectRef idx="0">
+              <a:schemeClr val="accent1"/>
+            </a:effectRef>
+            <a:fontRef idx="minor">
+              <a:schemeClr val="lt1"/>
+            </a:fontRef>
+          </p:style>
+          <p:txBody>
+            <a:bodyPr rtlCol="0" anchor="ctr"/>
+            <a:lstStyle/>
+            <a:p>
+              <a:pPr algn="ctr"/>
+              <a:endParaRPr lang="en-US"/>
+            </a:p>
+          </p:txBody>
+        </p:sp>
+      </p:grpSp>
+    </p:spTree>
+    <p:extLst>
+      <p:ext uri="{BB962C8B-B14F-4D97-AF65-F5344CB8AC3E}">
+        <p14:creationId xmlns:p14="http://schemas.microsoft.com/office/powerpoint/2010/main" val="2397572260"/>
+      </p:ext>
+    </p:extLst>
+  </p:cSld>
+  <p:clrMapOvr>
+    <a:masterClrMapping/>
+  </p:clrMapOvr>
+</p:sld>
+</file>
+
 <file path=ppt/slides/slide2.xml><?xml version="1.0" encoding="utf-8"?>
 <p:sld xmlns:a="http://schemas.openxmlformats.org/drawingml/2006/main" xmlns:r="http://schemas.openxmlformats.org/officeDocument/2006/relationships" xmlns:p="http://schemas.openxmlformats.org/presentationml/2006/main">
   <p:cSld>

</xml_diff>